<commit_message>
add images and update instructions
</commit_message>
<xml_diff>
--- a/img/ins/instructions2.3.19.pptx
+++ b/img/ins/instructions2.3.19.pptx
@@ -4316,31 +4316,19 @@
               <a:rPr lang="en-US" sz="6000" dirty="0">
                 <a:cs typeface="Arial" panose="020B0604020202020204" pitchFamily="34" charset="0"/>
               </a:rPr>
-              <a:t>​Following </a:t>
-            </a:r>
-            <a:r>
-              <a:rPr lang="en-US" sz="6000">
-                <a:cs typeface="Arial" panose="020B0604020202020204" pitchFamily="34" charset="0"/>
-              </a:rPr>
-              <a:t>the </a:t>
-            </a:r>
-            <a:r>
-              <a:rPr lang="en-US" altLang="zh-CN" sz="6000">
+              <a:t>​Following the </a:t>
+            </a:r>
+            <a:r>
+              <a:rPr lang="en-US" altLang="zh-CN" sz="6000" dirty="0">
                 <a:cs typeface="Arial" panose="020B0604020202020204" pitchFamily="34" charset="0"/>
               </a:rPr>
               <a:t>picture</a:t>
             </a:r>
             <a:r>
-              <a:rPr lang="en-US" sz="6000">
-                <a:cs typeface="Arial" panose="020B0604020202020204" pitchFamily="34" charset="0"/>
-              </a:rPr>
-              <a:t>,</a:t>
-            </a:r>
-            <a:r>
               <a:rPr lang="en-US" sz="6000" dirty="0">
                 <a:cs typeface="Arial" panose="020B0604020202020204" pitchFamily="34" charset="0"/>
               </a:rPr>
-              <a:t>  a </a:t>
+              <a:t>,  a </a:t>
             </a:r>
             <a:r>
               <a:rPr lang="en-US" altLang="zh-CN" sz="6000" dirty="0">
@@ -4550,10 +4538,10 @@
       </p:sp>
       <p:pic>
         <p:nvPicPr>
-          <p:cNvPr id="3" name="Picture 2">
+          <p:cNvPr id="4" name="Picture 3">
             <a:extLst>
               <a:ext uri="{FF2B5EF4-FFF2-40B4-BE49-F238E27FC236}">
-                <a16:creationId xmlns:a16="http://schemas.microsoft.com/office/drawing/2014/main" id="{FC0F6226-C690-0744-BF6B-61395EB1C5D6}"/>
+                <a16:creationId xmlns:a16="http://schemas.microsoft.com/office/drawing/2014/main" id="{1E443DF9-A85B-5D4F-B3A0-30434841F08C}"/>
               </a:ext>
             </a:extLst>
           </p:cNvPr>
@@ -4562,15 +4550,16 @@
           </p:cNvPicPr>
           <p:nvPr/>
         </p:nvPicPr>
-        <p:blipFill rotWithShape="1">
+        <p:blipFill>
           <a:blip r:embed="rId2"/>
-          <a:srcRect t="9697" b="10303"/>
-          <a:stretch/>
+          <a:stretch>
+            <a:fillRect/>
+          </a:stretch>
         </p:blipFill>
         <p:spPr>
           <a:xfrm>
-            <a:off x="1178789" y="7107380"/>
-            <a:ext cx="22368406" cy="6248401"/>
+            <a:off x="1772835" y="6858000"/>
+            <a:ext cx="20838330" cy="5913580"/>
           </a:xfrm>
           <a:prstGeom prst="rect">
             <a:avLst/>
@@ -4691,10 +4680,10 @@
       </p:sp>
       <p:pic>
         <p:nvPicPr>
-          <p:cNvPr id="5" name="Picture 4">
+          <p:cNvPr id="4" name="Picture 3">
             <a:extLst>
               <a:ext uri="{FF2B5EF4-FFF2-40B4-BE49-F238E27FC236}">
-                <a16:creationId xmlns:a16="http://schemas.microsoft.com/office/drawing/2014/main" id="{ABF2D558-5EBD-1D41-ABC1-8435D9597532}"/>
+                <a16:creationId xmlns:a16="http://schemas.microsoft.com/office/drawing/2014/main" id="{CF104B49-8AFA-E54A-8FA8-7D7075103370}"/>
               </a:ext>
             </a:extLst>
           </p:cNvPr>
@@ -4703,15 +4692,16 @@
           </p:cNvPicPr>
           <p:nvPr/>
         </p:nvPicPr>
-        <p:blipFill rotWithShape="1">
+        <p:blipFill>
           <a:blip r:embed="rId2"/>
-          <a:srcRect t="9697" b="10303"/>
-          <a:stretch/>
+          <a:stretch>
+            <a:fillRect/>
+          </a:stretch>
         </p:blipFill>
         <p:spPr>
           <a:xfrm>
-            <a:off x="1178789" y="7107380"/>
-            <a:ext cx="22368406" cy="6248401"/>
+            <a:off x="1772835" y="6858000"/>
+            <a:ext cx="20838330" cy="5913580"/>
           </a:xfrm>
           <a:prstGeom prst="rect">
             <a:avLst/>
@@ -5237,10 +5227,10 @@
       </p:sp>
       <p:pic>
         <p:nvPicPr>
-          <p:cNvPr id="3" name="Picture 2">
+          <p:cNvPr id="4" name="Picture 3">
             <a:extLst>
               <a:ext uri="{FF2B5EF4-FFF2-40B4-BE49-F238E27FC236}">
-                <a16:creationId xmlns:a16="http://schemas.microsoft.com/office/drawing/2014/main" id="{E1C37158-C0D0-314A-8437-688A4E18F20F}"/>
+                <a16:creationId xmlns:a16="http://schemas.microsoft.com/office/drawing/2014/main" id="{136F90D3-F43C-5244-83F7-7D5AB4BDAB26}"/>
               </a:ext>
             </a:extLst>
           </p:cNvPr>
@@ -5257,8 +5247,8 @@
         </p:blipFill>
         <p:spPr>
           <a:xfrm>
-            <a:off x="5907809" y="1661741"/>
-            <a:ext cx="14397182" cy="11788297"/>
+            <a:off x="4343400" y="1207840"/>
+            <a:ext cx="16560800" cy="12514391"/>
           </a:xfrm>
           <a:prstGeom prst="rect">
             <a:avLst/>

</xml_diff>